<commit_message>
Minor updates of slides for Termin_4.
</commit_message>
<xml_diff>
--- a/Termin_4/folien/UebungModellierung#4.pptx
+++ b/Termin_4/folien/UebungModellierung#4.pptx
@@ -5,29 +5,30 @@
     <p:sldMasterId id="2147483648" r:id="rId1"/>
   </p:sldMasterIdLst>
   <p:notesMasterIdLst>
-    <p:notesMasterId r:id="rId5"/>
+    <p:notesMasterId r:id="rId6"/>
   </p:notesMasterIdLst>
   <p:handoutMasterIdLst>
-    <p:handoutMasterId r:id="rId6"/>
+    <p:handoutMasterId r:id="rId7"/>
   </p:handoutMasterIdLst>
   <p:sldIdLst>
     <p:sldId id="892" r:id="rId2"/>
     <p:sldId id="966" r:id="rId3"/>
     <p:sldId id="979" r:id="rId4"/>
+    <p:sldId id="980" r:id="rId5"/>
   </p:sldIdLst>
   <p:sldSz cx="9144000" cy="6858000" type="screen4x3"/>
   <p:notesSz cx="7099300" cy="9601200"/>
   <p:embeddedFontLst>
     <p:embeddedFont>
       <p:font typeface="Calibri" pitchFamily="34" charset="0"/>
-      <p:regular r:id="rId7"/>
-      <p:bold r:id="rId8"/>
-      <p:italic r:id="rId9"/>
-      <p:boldItalic r:id="rId10"/>
+      <p:regular r:id="rId8"/>
+      <p:bold r:id="rId9"/>
+      <p:italic r:id="rId10"/>
+      <p:boldItalic r:id="rId11"/>
     </p:embeddedFont>
     <p:embeddedFont>
       <p:font typeface="MV Boli" pitchFamily="2" charset="0"/>
-      <p:regular r:id="rId11"/>
+      <p:regular r:id="rId12"/>
     </p:embeddedFont>
   </p:embeddedFontLst>
   <p:defaultTextStyle>
@@ -1203,6 +1204,108 @@
 </p:notes>
 </file>
 
+<file path=ppt/notesSlides/notesSlide4.xml><?xml version="1.0" encoding="utf-8"?>
+<p:notes xmlns:a="http://schemas.openxmlformats.org/drawingml/2006/main" xmlns:r="http://schemas.openxmlformats.org/officeDocument/2006/relationships" xmlns:p="http://schemas.openxmlformats.org/presentationml/2006/main">
+  <p:cSld>
+    <p:spTree>
+      <p:nvGrpSpPr>
+        <p:cNvPr id="1" name=""/>
+        <p:cNvGrpSpPr/>
+        <p:nvPr/>
+      </p:nvGrpSpPr>
+      <p:grpSpPr>
+        <a:xfrm>
+          <a:off x="0" y="0"/>
+          <a:ext cx="0" cy="0"/>
+          <a:chOff x="0" y="0"/>
+          <a:chExt cx="0" cy="0"/>
+        </a:xfrm>
+      </p:grpSpPr>
+      <p:sp>
+        <p:nvSpPr>
+          <p:cNvPr id="54274" name="Rectangle 7"/>
+          <p:cNvSpPr>
+            <a:spLocks noGrp="1" noChangeArrowheads="1"/>
+          </p:cNvSpPr>
+          <p:nvPr>
+            <p:ph type="sldNum" sz="quarter" idx="5"/>
+          </p:nvPr>
+        </p:nvSpPr>
+        <p:spPr/>
+        <p:txBody>
+          <a:bodyPr/>
+          <a:lstStyle/>
+          <a:p>
+            <a:pPr>
+              <a:defRPr/>
+            </a:pPr>
+            <a:fld id="{10FECC1A-FDCF-43AB-8611-DC3836B8FF46}" type="slidenum">
+              <a:rPr lang="de-DE" smtClean="0"/>
+              <a:pPr>
+                <a:defRPr/>
+              </a:pPr>
+              <a:t>4</a:t>
+            </a:fld>
+            <a:endParaRPr lang="de-DE" smtClean="0"/>
+          </a:p>
+        </p:txBody>
+      </p:sp>
+      <p:sp>
+        <p:nvSpPr>
+          <p:cNvPr id="28675" name="Rectangle 2"/>
+          <p:cNvSpPr>
+            <a:spLocks noGrp="1" noRot="1" noChangeAspect="1" noChangeArrowheads="1" noTextEdit="1"/>
+          </p:cNvSpPr>
+          <p:nvPr>
+            <p:ph type="sldImg"/>
+          </p:nvPr>
+        </p:nvSpPr>
+        <p:spPr>
+          <a:xfrm>
+            <a:off x="1152525" y="720725"/>
+            <a:ext cx="4799013" cy="3598863"/>
+          </a:xfrm>
+          <a:ln/>
+        </p:spPr>
+      </p:sp>
+      <p:sp>
+        <p:nvSpPr>
+          <p:cNvPr id="28676" name="Rectangle 3"/>
+          <p:cNvSpPr>
+            <a:spLocks noGrp="1" noChangeArrowheads="1"/>
+          </p:cNvSpPr>
+          <p:nvPr>
+            <p:ph type="body" idx="1"/>
+          </p:nvPr>
+        </p:nvSpPr>
+        <p:spPr>
+          <a:xfrm>
+            <a:off x="946150" y="4559300"/>
+            <a:ext cx="5207000" cy="4321175"/>
+          </a:xfrm>
+          <a:noFill/>
+          <a:ln/>
+        </p:spPr>
+        <p:txBody>
+          <a:bodyPr/>
+          <a:lstStyle/>
+          <a:p>
+            <a:pPr eaLnBrk="1" hangingPunct="1"/>
+            <a:r>
+              <a:rPr lang="en-US" dirty="0" smtClean="0"/>
+              <a:t>This is the main motivation…</a:t>
+            </a:r>
+          </a:p>
+        </p:txBody>
+      </p:sp>
+    </p:spTree>
+  </p:cSld>
+  <p:clrMapOvr>
+    <a:masterClrMapping/>
+  </p:clrMapOvr>
+</p:notes>
+</file>
+
 <file path=ppt/slideLayouts/slideLayout1.xml><?xml version="1.0" encoding="utf-8"?>
 <p:sldLayout xmlns:a="http://schemas.openxmlformats.org/drawingml/2006/main" xmlns:r="http://schemas.openxmlformats.org/officeDocument/2006/relationships" xmlns:p="http://schemas.openxmlformats.org/presentationml/2006/main" type="title" preserve="1">
   <p:cSld name="Titelfolie">
@@ -3078,7 +3181,7 @@
                 <a:latin typeface="Calibri" pitchFamily="34" charset="0"/>
                 <a:cs typeface="+mn-cs"/>
               </a:rPr>
-              <a:t>Übung zur Einführung in die Modellierung, Wintersemester 2016/17                 #</a:t>
+              <a:t>Seminar „Einführung in die Modellierung“, Wintersemester 2016/17                 #</a:t>
             </a:r>
             <a:fld id="{19621714-58BB-457A-826B-841F6E217726}" type="slidenum">
               <a:rPr lang="de-DE" noProof="0" smtClean="0">
@@ -3849,36 +3952,36 @@
                 <a:rPr lang="de-DE" sz="2000" dirty="0" smtClean="0">
                   <a:latin typeface="Calibri" pitchFamily="34" charset="0"/>
                 </a:rPr>
-                <a:t>Übung im </a:t>
+                <a:t>Seminar </a:t>
               </a:r>
               <a:r>
-                <a:rPr lang="de-DE" sz="2000" smtClean="0">
+                <a:rPr lang="de-DE" sz="2000" i="1" dirty="0" smtClean="0">
                   <a:latin typeface="Calibri" pitchFamily="34" charset="0"/>
                 </a:rPr>
-                <a:t>Modul </a:t>
-              </a:r>
-              <a:br>
-                <a:rPr lang="de-DE" sz="2000" smtClean="0">
-                  <a:latin typeface="Calibri" pitchFamily="34" charset="0"/>
-                </a:rPr>
-              </a:br>
-              <a:r>
-                <a:rPr lang="de-DE" sz="2000" smtClean="0">
-                  <a:latin typeface="Calibri" pitchFamily="34" charset="0"/>
-                </a:rPr>
-                <a:t>Versuchsplanung </a:t>
+                <a:t>Einführung in die Modellierung</a:t>
               </a:r>
               <a:r>
                 <a:rPr lang="de-DE" sz="2000" dirty="0" smtClean="0">
                   <a:latin typeface="Calibri" pitchFamily="34" charset="0"/>
                 </a:rPr>
-                <a:t>und </a:t>
+                <a:t/>
+              </a:r>
+              <a:br>
+                <a:rPr lang="de-DE" sz="2000" dirty="0" smtClean="0">
+                  <a:latin typeface="Calibri" pitchFamily="34" charset="0"/>
+                </a:rPr>
+              </a:br>
+              <a:r>
+                <a:rPr lang="de-DE" sz="2000" dirty="0" smtClean="0">
+                  <a:latin typeface="Calibri" pitchFamily="34" charset="0"/>
+                </a:rPr>
+                <a:t>im Modul </a:t>
               </a:r>
               <a:r>
-                <a:rPr lang="de-DE" sz="2000" smtClean="0">
+                <a:rPr lang="de-DE" sz="2000" i="1" dirty="0" smtClean="0">
                   <a:latin typeface="Calibri" pitchFamily="34" charset="0"/>
                 </a:rPr>
-                <a:t>Geoökologische Modellierung</a:t>
+                <a:t>Versuchsplanung und Geoökologische Modellierung</a:t>
               </a:r>
               <a:endParaRPr lang="de-DE" sz="2000" dirty="0" smtClean="0">
                 <a:latin typeface="Calibri" pitchFamily="34" charset="0"/>
@@ -4678,7 +4781,139 @@
               </a:rPr>
               <a:t>Abschlussquiz Hydrologie</a:t>
             </a:r>
-            <a:endParaRPr lang="de-DE" sz="2400" dirty="0" smtClean="0">
+          </a:p>
+        </p:txBody>
+      </p:sp>
+    </p:spTree>
+  </p:cSld>
+  <p:clrMapOvr>
+    <a:masterClrMapping/>
+  </p:clrMapOvr>
+  <p:transition>
+    <p:zoom/>
+  </p:transition>
+  <p:timing>
+    <p:tnLst>
+      <p:par>
+        <p:cTn id="1" dur="indefinite" restart="never" nodeType="tmRoot"/>
+      </p:par>
+    </p:tnLst>
+  </p:timing>
+</p:sld>
+</file>
+
+<file path=ppt/slides/slide4.xml><?xml version="1.0" encoding="utf-8"?>
+<p:sld xmlns:a="http://schemas.openxmlformats.org/drawingml/2006/main" xmlns:r="http://schemas.openxmlformats.org/officeDocument/2006/relationships" xmlns:p="http://schemas.openxmlformats.org/presentationml/2006/main">
+  <p:cSld>
+    <p:spTree>
+      <p:nvGrpSpPr>
+        <p:cNvPr id="1" name=""/>
+        <p:cNvGrpSpPr/>
+        <p:nvPr/>
+      </p:nvGrpSpPr>
+      <p:grpSpPr>
+        <a:xfrm>
+          <a:off x="0" y="0"/>
+          <a:ext cx="0" cy="0"/>
+          <a:chOff x="0" y="0"/>
+          <a:chExt cx="0" cy="0"/>
+        </a:xfrm>
+      </p:grpSpPr>
+      <p:sp>
+        <p:nvSpPr>
+          <p:cNvPr id="13" name="Textfeld 12"/>
+          <p:cNvSpPr txBox="1"/>
+          <p:nvPr/>
+        </p:nvSpPr>
+        <p:spPr>
+          <a:xfrm>
+            <a:off x="1" y="-21515"/>
+            <a:ext cx="9108504" cy="476250"/>
+          </a:xfrm>
+          <a:prstGeom prst="rect">
+            <a:avLst/>
+          </a:prstGeom>
+          <a:noFill/>
+          <a:effectLst/>
+        </p:spPr>
+        <p:txBody>
+          <a:bodyPr wrap="square" lIns="0" rIns="0" rtlCol="0">
+            <a:noAutofit/>
+          </a:bodyPr>
+          <a:lstStyle/>
+          <a:p>
+            <a:pPr algn="ctr">
+              <a:spcAft>
+                <a:spcPts val="0"/>
+              </a:spcAft>
+              <a:defRPr/>
+            </a:pPr>
+            <a:r>
+              <a:rPr lang="de-DE" sz="2800" dirty="0" smtClean="0">
+                <a:solidFill>
+                  <a:schemeClr val="bg1">
+                    <a:lumMod val="85000"/>
+                  </a:schemeClr>
+                </a:solidFill>
+                <a:latin typeface="Calibri" pitchFamily="34" charset="0"/>
+              </a:rPr>
+              <a:t>Rekapitulation: Das </a:t>
+            </a:r>
+            <a:r>
+              <a:rPr lang="de-DE" sz="2800" i="1" dirty="0" smtClean="0">
+                <a:solidFill>
+                  <a:schemeClr val="bg1">
+                    <a:lumMod val="85000"/>
+                  </a:schemeClr>
+                </a:solidFill>
+                <a:latin typeface="Calibri" pitchFamily="34" charset="0"/>
+              </a:rPr>
+              <a:t>abcd</a:t>
+            </a:r>
+            <a:r>
+              <a:rPr lang="de-DE" sz="2800" dirty="0" smtClean="0">
+                <a:solidFill>
+                  <a:schemeClr val="bg1">
+                    <a:lumMod val="85000"/>
+                  </a:schemeClr>
+                </a:solidFill>
+                <a:latin typeface="Calibri" pitchFamily="34" charset="0"/>
+              </a:rPr>
+              <a:t>-Modell </a:t>
+            </a:r>
+          </a:p>
+        </p:txBody>
+      </p:sp>
+      <p:sp>
+        <p:nvSpPr>
+          <p:cNvPr id="10" name="Textfeld 9"/>
+          <p:cNvSpPr txBox="1"/>
+          <p:nvPr/>
+        </p:nvSpPr>
+        <p:spPr>
+          <a:xfrm>
+            <a:off x="755576" y="908720"/>
+            <a:ext cx="2736230" cy="523220"/>
+          </a:xfrm>
+          <a:prstGeom prst="rect">
+            <a:avLst/>
+          </a:prstGeom>
+          <a:noFill/>
+        </p:spPr>
+        <p:txBody>
+          <a:bodyPr wrap="square" rtlCol="0">
+            <a:spAutoFit/>
+          </a:bodyPr>
+          <a:lstStyle/>
+          <a:p>
+            <a:pPr algn="ctr"/>
+            <a:r>
+              <a:rPr lang="de-DE" sz="2800" dirty="0" smtClean="0">
+                <a:latin typeface="Calibri" pitchFamily="34" charset="0"/>
+              </a:rPr>
+              <a:t>…</a:t>
+            </a:r>
+            <a:endParaRPr lang="de-DE" sz="2800" dirty="0">
               <a:latin typeface="Calibri" pitchFamily="34" charset="0"/>
             </a:endParaRPr>
           </a:p>

</xml_diff>

<commit_message>
Add pep results and adjust slides for Termin 4 to odp
</commit_message>
<xml_diff>
--- a/Termin_4/folien/UebungModellierung#4.pptx
+++ b/Termin_4/folien/UebungModellierung#4.pptx
@@ -403,7 +403,7 @@
     </p:spTree>
     <p:extLst>
       <p:ext uri="{BB962C8B-B14F-4D97-AF65-F5344CB8AC3E}">
-        <p14:creationId xmlns="" xmlns:p14="http://schemas.microsoft.com/office/powerpoint/2010/main" val="1882660213"/>
+        <p14:creationId xmlns:p14="http://schemas.microsoft.com/office/powerpoint/2010/main" xmlns="" val="1882660213"/>
       </p:ext>
     </p:extLst>
   </p:cSld>
@@ -742,7 +742,7 @@
     </p:spTree>
     <p:extLst>
       <p:ext uri="{BB962C8B-B14F-4D97-AF65-F5344CB8AC3E}">
-        <p14:creationId xmlns="" xmlns:p14="http://schemas.microsoft.com/office/powerpoint/2010/main" val="2781074432"/>
+        <p14:creationId xmlns:p14="http://schemas.microsoft.com/office/powerpoint/2010/main" xmlns="" val="2781074432"/>
       </p:ext>
     </p:extLst>
   </p:cSld>
@@ -4517,7 +4517,47 @@
                 <a:latin typeface="Calibri" pitchFamily="34" charset="0"/>
                 <a:cs typeface="+mn-cs"/>
               </a:rPr>
-              <a:t>Seminar „Einführung in die Modellierung“, Wintersemester 2016/17                 #</a:t>
+              <a:t>Übung </a:t>
+            </a:r>
+            <a:r>
+              <a:rPr lang="de-DE" noProof="0" dirty="0" smtClean="0">
+                <a:solidFill>
+                  <a:schemeClr val="bg1"/>
+                </a:solidFill>
+                <a:latin typeface="Calibri" pitchFamily="34" charset="0"/>
+                <a:cs typeface="+mn-cs"/>
+              </a:rPr>
+              <a:t>„Einführung in die Modellierung</a:t>
+            </a:r>
+            <a:r>
+              <a:rPr lang="de-DE" noProof="0" dirty="0" smtClean="0">
+                <a:solidFill>
+                  <a:schemeClr val="bg1"/>
+                </a:solidFill>
+                <a:latin typeface="Calibri" pitchFamily="34" charset="0"/>
+                <a:cs typeface="+mn-cs"/>
+              </a:rPr>
+              <a:t>“    			</a:t>
+            </a:r>
+            <a:r>
+              <a:rPr lang="de-DE" baseline="0" noProof="0" dirty="0" smtClean="0">
+                <a:solidFill>
+                  <a:schemeClr val="bg1"/>
+                </a:solidFill>
+                <a:latin typeface="Calibri" pitchFamily="34" charset="0"/>
+                <a:cs typeface="+mn-cs"/>
+              </a:rPr>
+              <a:t>       </a:t>
+            </a:r>
+            <a:r>
+              <a:rPr lang="de-DE" noProof="0" dirty="0" smtClean="0">
+                <a:solidFill>
+                  <a:schemeClr val="bg1"/>
+                </a:solidFill>
+                <a:latin typeface="Calibri" pitchFamily="34" charset="0"/>
+                <a:cs typeface="+mn-cs"/>
+              </a:rPr>
+              <a:t>#</a:t>
             </a:r>
             <a:fld id="{19621714-58BB-457A-826B-841F6E217726}" type="slidenum">
               <a:rPr lang="de-DE" noProof="0" smtClean="0">
@@ -5044,8 +5084,17 @@
               <a:rPr lang="de-DE" sz="3600" dirty="0" smtClean="0">
                 <a:latin typeface="Calibri" pitchFamily="34" charset="0"/>
               </a:rPr>
-              <a:t>Wintersemester 2016/17</a:t>
-            </a:r>
+              <a:t>Wintersemester </a:t>
+            </a:r>
+            <a:r>
+              <a:rPr lang="de-DE" sz="3600" dirty="0" smtClean="0">
+                <a:latin typeface="Calibri" pitchFamily="34" charset="0"/>
+              </a:rPr>
+              <a:t>2017/18</a:t>
+            </a:r>
+            <a:endParaRPr lang="de-DE" sz="3600" dirty="0" smtClean="0">
+              <a:latin typeface="Calibri" pitchFamily="34" charset="0"/>
+            </a:endParaRPr>
           </a:p>
           <a:p>
             <a:pPr lvl="0" algn="ctr">
@@ -12852,16 +12901,7 @@
                 </a:solidFill>
                 <a:latin typeface="Calibri" pitchFamily="34" charset="0"/>
               </a:rPr>
-              <a:t>= </a:t>
-            </a:r>
-            <a:r>
-              <a:rPr lang="de-DE" sz="2000" dirty="0" smtClean="0">
-                <a:solidFill>
-                  <a:srgbClr val="C00000"/>
-                </a:solidFill>
-                <a:latin typeface="Calibri" pitchFamily="34" charset="0"/>
-              </a:rPr>
-              <a:t>b </a:t>
+              <a:t>= b </a:t>
             </a:r>
             <a:r>
               <a:rPr lang="de-DE" sz="2000" baseline="30000" dirty="0" smtClean="0">
@@ -12928,16 +12968,7 @@
                 </a:solidFill>
                 <a:latin typeface="Calibri" pitchFamily="34" charset="0"/>
               </a:rPr>
-              <a:t>= </a:t>
-            </a:r>
-            <a:r>
-              <a:rPr lang="de-DE" sz="2000" dirty="0" smtClean="0">
-                <a:solidFill>
-                  <a:srgbClr val="C00000"/>
-                </a:solidFill>
-                <a:latin typeface="Calibri" pitchFamily="34" charset="0"/>
-              </a:rPr>
-              <a:t>a </a:t>
+              <a:t>= a </a:t>
             </a:r>
             <a:r>
               <a:rPr lang="de-DE" sz="2000" baseline="30000" dirty="0" smtClean="0">
@@ -15447,16 +15478,7 @@
                 </a:solidFill>
                 <a:latin typeface="Calibri" pitchFamily="34" charset="0"/>
               </a:rPr>
-              <a:t>= </a:t>
-            </a:r>
-            <a:r>
-              <a:rPr lang="de-DE" sz="2000" dirty="0" smtClean="0">
-                <a:solidFill>
-                  <a:srgbClr val="C00000"/>
-                </a:solidFill>
-                <a:latin typeface="Calibri" pitchFamily="34" charset="0"/>
-              </a:rPr>
-              <a:t>b </a:t>
+              <a:t>= b </a:t>
             </a:r>
             <a:r>
               <a:rPr lang="de-DE" sz="2000" baseline="30000" dirty="0" smtClean="0">
@@ -15523,16 +15545,7 @@
                 </a:solidFill>
                 <a:latin typeface="Calibri" pitchFamily="34" charset="0"/>
               </a:rPr>
-              <a:t>= </a:t>
-            </a:r>
-            <a:r>
-              <a:rPr lang="de-DE" sz="2000" dirty="0" smtClean="0">
-                <a:solidFill>
-                  <a:srgbClr val="C00000"/>
-                </a:solidFill>
-                <a:latin typeface="Calibri" pitchFamily="34" charset="0"/>
-              </a:rPr>
-              <a:t>a </a:t>
+              <a:t>= a </a:t>
             </a:r>
             <a:r>
               <a:rPr lang="de-DE" sz="2000" baseline="30000" dirty="0" smtClean="0">
@@ -17391,16 +17404,7 @@
                 </a:solidFill>
                 <a:latin typeface="Calibri" pitchFamily="34" charset="0"/>
               </a:rPr>
-              <a:t>= </a:t>
-            </a:r>
-            <a:r>
-              <a:rPr lang="de-DE" sz="2000" dirty="0" smtClean="0">
-                <a:solidFill>
-                  <a:srgbClr val="C00000"/>
-                </a:solidFill>
-                <a:latin typeface="Calibri" pitchFamily="34" charset="0"/>
-              </a:rPr>
-              <a:t>b </a:t>
+              <a:t>= b </a:t>
             </a:r>
             <a:r>
               <a:rPr lang="de-DE" sz="2000" baseline="30000" dirty="0" smtClean="0">
@@ -17467,16 +17471,7 @@
                 </a:solidFill>
                 <a:latin typeface="Calibri" pitchFamily="34" charset="0"/>
               </a:rPr>
-              <a:t>= </a:t>
-            </a:r>
-            <a:r>
-              <a:rPr lang="de-DE" sz="2000" dirty="0" smtClean="0">
-                <a:solidFill>
-                  <a:srgbClr val="C00000"/>
-                </a:solidFill>
-                <a:latin typeface="Calibri" pitchFamily="34" charset="0"/>
-              </a:rPr>
-              <a:t>a </a:t>
+              <a:t>= a </a:t>
             </a:r>
             <a:r>
               <a:rPr lang="de-DE" sz="2000" baseline="30000" dirty="0" smtClean="0">
@@ -19219,8 +19214,17 @@
               <a:rPr lang="de-DE" sz="3600" dirty="0" smtClean="0">
                 <a:latin typeface="Calibri" pitchFamily="34" charset="0"/>
               </a:rPr>
-              <a:t>Wintersemester 2016/17</a:t>
-            </a:r>
+              <a:t>Wintersemester </a:t>
+            </a:r>
+            <a:r>
+              <a:rPr lang="de-DE" sz="3600" dirty="0" smtClean="0">
+                <a:latin typeface="Calibri" pitchFamily="34" charset="0"/>
+              </a:rPr>
+              <a:t>2017/18</a:t>
+            </a:r>
+            <a:endParaRPr lang="de-DE" sz="3600" dirty="0" smtClean="0">
+              <a:latin typeface="Calibri" pitchFamily="34" charset="0"/>
+            </a:endParaRPr>
           </a:p>
           <a:p>
             <a:pPr lvl="0" algn="ctr">
@@ -19560,8 +19564,17 @@
               <a:rPr lang="de-DE" sz="3600" dirty="0" smtClean="0">
                 <a:latin typeface="Calibri" pitchFamily="34" charset="0"/>
               </a:rPr>
-              <a:t>Wintersemester 2016/17</a:t>
-            </a:r>
+              <a:t>Wintersemester </a:t>
+            </a:r>
+            <a:r>
+              <a:rPr lang="de-DE" sz="3600" dirty="0" smtClean="0">
+                <a:latin typeface="Calibri" pitchFamily="34" charset="0"/>
+              </a:rPr>
+              <a:t>2017/18</a:t>
+            </a:r>
+            <a:endParaRPr lang="de-DE" sz="3600" dirty="0" smtClean="0">
+              <a:latin typeface="Calibri" pitchFamily="34" charset="0"/>
+            </a:endParaRPr>
           </a:p>
           <a:p>
             <a:pPr lvl="0" algn="ctr">

</xml_diff>